<commit_message>
Deployed db7bd33 with MkDocs version: 1.1.2
</commit_message>
<xml_diff>
--- a/slides/Unit19_Multi-Dimensional Arrays.pptx
+++ b/slides/Unit19_Multi-Dimensional Arrays.pptx
@@ -187,7 +187,7 @@
 <file path=ppt/revisionInfo.xml><?xml version="1.0" encoding="utf-8"?>
 <p1510:revInfo xmlns:a="http://schemas.openxmlformats.org/drawingml/2006/main" xmlns:r="http://schemas.openxmlformats.org/officeDocument/2006/relationships" xmlns:p1510="http://schemas.microsoft.com/office/powerpoint/2015/10/main">
   <p1510:revLst>
-    <p1510:client id="{28AEA613-C2D1-4884-898F-364599B60A84}" v="1131" dt="2021-03-08T05:34:54.250"/>
+    <p1510:client id="{28AEA613-C2D1-4884-898F-364599B60A84}" v="1173" dt="2021-03-11T06:28:19.947"/>
   </p1510:revLst>
 </p1510:revInfo>
 </file>
@@ -6909,7 +6909,7 @@
   <pc:docChgLst>
     <pc:chgData name="Zhao Jin" userId="cd05a825-544c-438a-9ba1-08e63db50b47" providerId="ADAL" clId="{28AEA613-C2D1-4884-898F-364599B60A84}"/>
     <pc:docChg chg="undo custSel addSld delSld modSld sldOrd">
-      <pc:chgData name="Zhao Jin" userId="cd05a825-544c-438a-9ba1-08e63db50b47" providerId="ADAL" clId="{28AEA613-C2D1-4884-898F-364599B60A84}" dt="2021-03-08T05:35:17.057" v="4597" actId="1076"/>
+      <pc:chgData name="Zhao Jin" userId="cd05a825-544c-438a-9ba1-08e63db50b47" providerId="ADAL" clId="{28AEA613-C2D1-4884-898F-364599B60A84}" dt="2021-03-11T06:28:25.568" v="5072" actId="14100"/>
       <pc:docMkLst>
         <pc:docMk/>
       </pc:docMkLst>
@@ -8171,13 +8171,13 @@
         </pc:spChg>
       </pc:sldChg>
       <pc:sldChg chg="addSp delSp modSp add mod modAnim">
-        <pc:chgData name="Zhao Jin" userId="cd05a825-544c-438a-9ba1-08e63db50b47" providerId="ADAL" clId="{28AEA613-C2D1-4884-898F-364599B60A84}" dt="2021-03-02T10:07:54.387" v="4210"/>
+        <pc:chgData name="Zhao Jin" userId="cd05a825-544c-438a-9ba1-08e63db50b47" providerId="ADAL" clId="{28AEA613-C2D1-4884-898F-364599B60A84}" dt="2021-03-11T06:28:25.568" v="5072" actId="14100"/>
         <pc:sldMkLst>
           <pc:docMk/>
           <pc:sldMk cId="1514327557" sldId="643"/>
         </pc:sldMkLst>
         <pc:spChg chg="mod">
-          <ac:chgData name="Zhao Jin" userId="cd05a825-544c-438a-9ba1-08e63db50b47" providerId="ADAL" clId="{28AEA613-C2D1-4884-898F-364599B60A84}" dt="2021-03-02T10:07:54.164" v="4209" actId="20577"/>
+          <ac:chgData name="Zhao Jin" userId="cd05a825-544c-438a-9ba1-08e63db50b47" providerId="ADAL" clId="{28AEA613-C2D1-4884-898F-364599B60A84}" dt="2021-03-10T04:39:54.809" v="5053" actId="20577"/>
           <ac:spMkLst>
             <pc:docMk/>
             <pc:sldMk cId="1514327557" sldId="643"/>
@@ -8185,7 +8185,7 @@
           </ac:spMkLst>
         </pc:spChg>
         <pc:spChg chg="add mod">
-          <ac:chgData name="Zhao Jin" userId="cd05a825-544c-438a-9ba1-08e63db50b47" providerId="ADAL" clId="{28AEA613-C2D1-4884-898F-364599B60A84}" dt="2021-03-02T10:07:30.236" v="4199" actId="1035"/>
+          <ac:chgData name="Zhao Jin" userId="cd05a825-544c-438a-9ba1-08e63db50b47" providerId="ADAL" clId="{28AEA613-C2D1-4884-898F-364599B60A84}" dt="2021-03-10T04:35:28.950" v="4791" actId="14100"/>
           <ac:spMkLst>
             <pc:docMk/>
             <pc:sldMk cId="1514327557" sldId="643"/>
@@ -8193,7 +8193,7 @@
           </ac:spMkLst>
         </pc:spChg>
         <pc:spChg chg="mod">
-          <ac:chgData name="Zhao Jin" userId="cd05a825-544c-438a-9ba1-08e63db50b47" providerId="ADAL" clId="{28AEA613-C2D1-4884-898F-364599B60A84}" dt="2021-03-02T10:01:18.469" v="3962" actId="20577"/>
+          <ac:chgData name="Zhao Jin" userId="cd05a825-544c-438a-9ba1-08e63db50b47" providerId="ADAL" clId="{28AEA613-C2D1-4884-898F-364599B60A84}" dt="2021-03-11T06:28:19.947" v="5071" actId="6549"/>
           <ac:spMkLst>
             <pc:docMk/>
             <pc:sldMk cId="1514327557" sldId="643"/>
@@ -8201,7 +8201,7 @@
           </ac:spMkLst>
         </pc:spChg>
         <pc:spChg chg="mod">
-          <ac:chgData name="Zhao Jin" userId="cd05a825-544c-438a-9ba1-08e63db50b47" providerId="ADAL" clId="{28AEA613-C2D1-4884-898F-364599B60A84}" dt="2021-03-02T09:59:11.017" v="3819" actId="207"/>
+          <ac:chgData name="Zhao Jin" userId="cd05a825-544c-438a-9ba1-08e63db50b47" providerId="ADAL" clId="{28AEA613-C2D1-4884-898F-364599B60A84}" dt="2021-03-10T04:36:46.931" v="4808" actId="1076"/>
           <ac:spMkLst>
             <pc:docMk/>
             <pc:sldMk cId="1514327557" sldId="643"/>
@@ -8353,7 +8353,7 @@
           </ac:grpSpMkLst>
         </pc:grpChg>
         <pc:cxnChg chg="add mod">
-          <ac:chgData name="Zhao Jin" userId="cd05a825-544c-438a-9ba1-08e63db50b47" providerId="ADAL" clId="{28AEA613-C2D1-4884-898F-364599B60A84}" dt="2021-03-02T10:07:33.034" v="4200" actId="14100"/>
+          <ac:chgData name="Zhao Jin" userId="cd05a825-544c-438a-9ba1-08e63db50b47" providerId="ADAL" clId="{28AEA613-C2D1-4884-898F-364599B60A84}" dt="2021-03-11T06:28:25.568" v="5072" actId="14100"/>
           <ac:cxnSpMkLst>
             <pc:docMk/>
             <pc:sldMk cId="1514327557" sldId="643"/>
@@ -9106,7 +9106,7 @@
               <a:pPr>
                 <a:defRPr/>
               </a:pPr>
-              <a:t>3/8/2021</a:t>
+              <a:t>3/11/2021</a:t>
             </a:fld>
             <a:endParaRPr lang="en-US" dirty="0"/>
           </a:p>
@@ -15647,10 +15647,63 @@
               <a:buChar char="§"/>
               <a:defRPr/>
             </a:pPr>
+            <a:endParaRPr lang="en-US" dirty="0"/>
+          </a:p>
+          <a:p>
+            <a:pPr marL="0" indent="0">
+              <a:spcBef>
+                <a:spcPts val="600"/>
+              </a:spcBef>
+              <a:buClr>
+                <a:schemeClr val="tx1">
+                  <a:lumMod val="90000"/>
+                  <a:lumOff val="10000"/>
+                </a:schemeClr>
+              </a:buClr>
+              <a:buSzPct val="100000"/>
+              <a:buNone/>
+              <a:defRPr/>
+            </a:pPr>
+            <a:endParaRPr lang="en-US" dirty="0"/>
+          </a:p>
+          <a:p>
+            <a:pPr marL="347663" indent="-347663">
+              <a:spcBef>
+                <a:spcPts val="600"/>
+              </a:spcBef>
+              <a:buClr>
+                <a:schemeClr val="tx1">
+                  <a:lumMod val="90000"/>
+                  <a:lumOff val="10000"/>
+                </a:schemeClr>
+              </a:buClr>
+              <a:buSzPct val="100000"/>
+              <a:buFont typeface="Wingdings" panose="05000000000000000000" pitchFamily="2" charset="2"/>
+              <a:buChar char="§"/>
+              <a:defRPr/>
+            </a:pPr>
             <a:r>
               <a:rPr lang="en-US" dirty="0"/>
               <a:t>Actual function call</a:t>
             </a:r>
+          </a:p>
+          <a:p>
+            <a:pPr marL="347663" indent="-347663">
+              <a:spcBef>
+                <a:spcPts val="600"/>
+              </a:spcBef>
+              <a:buClr>
+                <a:schemeClr val="tx1">
+                  <a:lumMod val="90000"/>
+                  <a:lumOff val="10000"/>
+                </a:schemeClr>
+              </a:buClr>
+              <a:buSzPct val="100000"/>
+              <a:buFont typeface="Wingdings" panose="05000000000000000000" pitchFamily="2" charset="2"/>
+              <a:buChar char="§"/>
+              <a:defRPr/>
+            </a:pPr>
+            <a:endParaRPr lang="en-US" sz="2400" dirty="0"/>
           </a:p>
           <a:p>
             <a:pPr marL="347663" indent="-347663">
@@ -15686,28 +15739,15 @@
               <a:buChar char="§"/>
               <a:defRPr/>
             </a:pPr>
-            <a:endParaRPr lang="en-US" dirty="0"/>
-          </a:p>
-          <a:p>
-            <a:pPr marL="347663" indent="-347663">
-              <a:spcBef>
-                <a:spcPts val="600"/>
-              </a:spcBef>
-              <a:buClr>
-                <a:schemeClr val="tx1">
-                  <a:lumMod val="90000"/>
-                  <a:lumOff val="10000"/>
-                </a:schemeClr>
-              </a:buClr>
-              <a:buSzPct val="100000"/>
-              <a:buFont typeface="Wingdings" panose="05000000000000000000" pitchFamily="2" charset="2"/>
-              <a:buChar char="§"/>
-              <a:defRPr/>
-            </a:pPr>
-            <a:r>
-              <a:rPr lang="en-US" dirty="0"/>
-              <a:t>The number of columns must be known at the time of coding.</a:t>
-            </a:r>
+            <a:r>
+              <a:rPr lang="en-US" sz="2000" dirty="0"/>
+              <a:t>Note: The first method is only for Fixed Length 2D Array since the number of columns must be known at the time </a:t>
+            </a:r>
+            <a:r>
+              <a:rPr lang="en-US" sz="2000"/>
+              <a:t>of coding.</a:t>
+            </a:r>
+            <a:endParaRPr lang="en-US" sz="2000" dirty="0"/>
           </a:p>
           <a:p>
             <a:pPr marL="347663" indent="-347663">
@@ -15727,96 +15767,6 @@
             </a:pPr>
             <a:endParaRPr lang="en-US" sz="2800" dirty="0"/>
           </a:p>
-          <a:p>
-            <a:pPr marL="347663" indent="-347663">
-              <a:spcBef>
-                <a:spcPts val="600"/>
-              </a:spcBef>
-              <a:buClr>
-                <a:schemeClr val="tx1">
-                  <a:lumMod val="90000"/>
-                  <a:lumOff val="10000"/>
-                </a:schemeClr>
-              </a:buClr>
-              <a:buSzPct val="100000"/>
-              <a:buFont typeface="Wingdings" panose="05000000000000000000" pitchFamily="2" charset="2"/>
-              <a:buChar char="§"/>
-              <a:defRPr/>
-            </a:pPr>
-            <a:endParaRPr lang="en-US" sz="2800" dirty="0"/>
-          </a:p>
-          <a:p>
-            <a:pPr marL="347663" indent="-347663">
-              <a:spcBef>
-                <a:spcPts val="600"/>
-              </a:spcBef>
-              <a:buClr>
-                <a:schemeClr val="tx1">
-                  <a:lumMod val="90000"/>
-                  <a:lumOff val="10000"/>
-                </a:schemeClr>
-              </a:buClr>
-              <a:buSzPct val="100000"/>
-              <a:buFont typeface="Wingdings" panose="05000000000000000000" pitchFamily="2" charset="2"/>
-              <a:buChar char="§"/>
-              <a:defRPr/>
-            </a:pPr>
-            <a:endParaRPr lang="en-US" sz="2800" dirty="0"/>
-          </a:p>
-          <a:p>
-            <a:pPr marL="347663" indent="-347663">
-              <a:spcBef>
-                <a:spcPts val="600"/>
-              </a:spcBef>
-              <a:buClr>
-                <a:schemeClr val="tx1">
-                  <a:lumMod val="90000"/>
-                  <a:lumOff val="10000"/>
-                </a:schemeClr>
-              </a:buClr>
-              <a:buSzPct val="100000"/>
-              <a:buFont typeface="Wingdings" panose="05000000000000000000" pitchFamily="2" charset="2"/>
-              <a:buChar char="§"/>
-              <a:defRPr/>
-            </a:pPr>
-            <a:endParaRPr lang="en-US" sz="800" dirty="0"/>
-          </a:p>
-          <a:p>
-            <a:pPr marL="621983" lvl="1" indent="-347663">
-              <a:spcBef>
-                <a:spcPts val="600"/>
-              </a:spcBef>
-              <a:buClr>
-                <a:schemeClr val="tx1">
-                  <a:lumMod val="90000"/>
-                  <a:lumOff val="10000"/>
-                </a:schemeClr>
-              </a:buClr>
-              <a:buSzPct val="100000"/>
-              <a:buFont typeface="Wingdings" panose="05000000000000000000" pitchFamily="2" charset="2"/>
-              <a:buChar char="§"/>
-              <a:defRPr/>
-            </a:pPr>
-            <a:endParaRPr lang="en-US" sz="2400" dirty="0"/>
-          </a:p>
-          <a:p>
-            <a:pPr marL="347663" indent="-347663">
-              <a:spcBef>
-                <a:spcPts val="600"/>
-              </a:spcBef>
-              <a:buClr>
-                <a:schemeClr val="tx1">
-                  <a:lumMod val="90000"/>
-                  <a:lumOff val="10000"/>
-                </a:schemeClr>
-              </a:buClr>
-              <a:buSzPct val="100000"/>
-              <a:buFont typeface="Wingdings" panose="05000000000000000000" pitchFamily="2" charset="2"/>
-              <a:buChar char="§"/>
-              <a:defRPr/>
-            </a:pPr>
-            <a:endParaRPr lang="en-US" sz="2800" dirty="0"/>
-          </a:p>
         </p:txBody>
       </p:sp>
       <p:sp>
@@ -15833,8 +15783,8 @@
         </p:nvSpPr>
         <p:spPr>
           <a:xfrm>
-            <a:off x="994932" y="1677173"/>
-            <a:ext cx="7939274" cy="1477328"/>
+            <a:off x="994932" y="1713227"/>
+            <a:ext cx="6217526" cy="2308324"/>
           </a:xfrm>
           <a:prstGeom prst="rect">
             <a:avLst/>
@@ -16020,17 +15970,17 @@
                 <a:latin typeface="Courier New" pitchFamily="49" charset="0"/>
                 <a:cs typeface="Courier New" pitchFamily="49" charset="0"/>
               </a:rPr>
-              <a:t> (* </a:t>
-            </a:r>
-            <a:r>
-              <a:rPr lang="en-US" b="1" dirty="0" err="1">
-                <a:solidFill>
-                  <a:schemeClr val="tx1"/>
+              <a:t> matrix[][</a:t>
+            </a:r>
+            <a:r>
+              <a:rPr lang="en-US" b="1" dirty="0">
+                <a:solidFill>
+                  <a:srgbClr val="C00000"/>
                 </a:solidFill>
                 <a:latin typeface="Courier New" pitchFamily="49" charset="0"/>
                 <a:cs typeface="Courier New" pitchFamily="49" charset="0"/>
               </a:rPr>
-              <a:t>matrix_row</a:t>
+              <a:t>20</a:t>
             </a:r>
             <a:r>
               <a:rPr lang="en-US" b="1" dirty="0">
@@ -16040,17 +15990,34 @@
                 <a:latin typeface="Courier New" pitchFamily="49" charset="0"/>
                 <a:cs typeface="Courier New" pitchFamily="49" charset="0"/>
               </a:rPr>
-              <a:t>)[</a:t>
-            </a:r>
+              <a:t>]) { .. }</a:t>
+            </a:r>
+          </a:p>
+          <a:p>
+            <a:pPr>
+              <a:defRPr/>
+            </a:pPr>
+            <a:endParaRPr lang="en-US" b="1" dirty="0">
+              <a:solidFill>
+                <a:srgbClr val="0000FF"/>
+              </a:solidFill>
+              <a:latin typeface="Courier New" pitchFamily="49" charset="0"/>
+              <a:cs typeface="Courier New" pitchFamily="49" charset="0"/>
+            </a:endParaRPr>
+          </a:p>
+          <a:p>
+            <a:pPr>
+              <a:defRPr/>
+            </a:pPr>
             <a:r>
               <a:rPr lang="en-US" b="1" dirty="0">
                 <a:solidFill>
-                  <a:srgbClr val="C00000"/>
+                  <a:srgbClr val="0000FF"/>
                 </a:solidFill>
                 <a:latin typeface="Courier New" pitchFamily="49" charset="0"/>
                 <a:cs typeface="Courier New" pitchFamily="49" charset="0"/>
               </a:rPr>
-              <a:t>20</a:t>
+              <a:t>void</a:t>
             </a:r>
             <a:r>
               <a:rPr lang="en-US" b="1" dirty="0">
@@ -16060,7 +16027,146 @@
                 <a:latin typeface="Courier New" pitchFamily="49" charset="0"/>
                 <a:cs typeface="Courier New" pitchFamily="49" charset="0"/>
               </a:rPr>
-              <a:t>]) { .. }</a:t>
+              <a:t> </a:t>
+            </a:r>
+            <a:r>
+              <a:rPr lang="en-US" b="1" dirty="0" err="1">
+                <a:solidFill>
+                  <a:schemeClr val="tx1"/>
+                </a:solidFill>
+                <a:latin typeface="Courier New" pitchFamily="49" charset="0"/>
+                <a:cs typeface="Courier New" pitchFamily="49" charset="0"/>
+              </a:rPr>
+              <a:t>qux</a:t>
+            </a:r>
+            <a:r>
+              <a:rPr lang="en-US" b="1" dirty="0">
+                <a:solidFill>
+                  <a:schemeClr val="tx1"/>
+                </a:solidFill>
+                <a:latin typeface="Courier New" pitchFamily="49" charset="0"/>
+                <a:cs typeface="Courier New" pitchFamily="49" charset="0"/>
+              </a:rPr>
+              <a:t>(</a:t>
+            </a:r>
+            <a:r>
+              <a:rPr lang="en-US" b="1" dirty="0">
+                <a:solidFill>
+                  <a:srgbClr val="0000FF"/>
+                </a:solidFill>
+                <a:latin typeface="Courier New" pitchFamily="49" charset="0"/>
+                <a:cs typeface="Courier New" pitchFamily="49" charset="0"/>
+              </a:rPr>
+              <a:t>long</a:t>
+            </a:r>
+            <a:r>
+              <a:rPr lang="en-US" b="1" dirty="0">
+                <a:solidFill>
+                  <a:schemeClr val="tx1"/>
+                </a:solidFill>
+                <a:latin typeface="Courier New" pitchFamily="49" charset="0"/>
+                <a:cs typeface="Courier New" pitchFamily="49" charset="0"/>
+              </a:rPr>
+              <a:t> </a:t>
+            </a:r>
+            <a:r>
+              <a:rPr lang="en-US" b="1" dirty="0" err="1">
+                <a:solidFill>
+                  <a:schemeClr val="tx1"/>
+                </a:solidFill>
+                <a:latin typeface="Courier New" pitchFamily="49" charset="0"/>
+                <a:cs typeface="Courier New" pitchFamily="49" charset="0"/>
+              </a:rPr>
+              <a:t>num_of_rows</a:t>
+            </a:r>
+            <a:r>
+              <a:rPr lang="en-US" b="1" dirty="0">
+                <a:solidFill>
+                  <a:schemeClr val="tx1"/>
+                </a:solidFill>
+                <a:latin typeface="Courier New" pitchFamily="49" charset="0"/>
+                <a:cs typeface="Courier New" pitchFamily="49" charset="0"/>
+              </a:rPr>
+              <a:t>, </a:t>
+            </a:r>
+            <a:r>
+              <a:rPr lang="en-US" b="1" dirty="0">
+                <a:solidFill>
+                  <a:srgbClr val="0000FF"/>
+                </a:solidFill>
+                <a:latin typeface="Courier New" pitchFamily="49" charset="0"/>
+                <a:cs typeface="Courier New" pitchFamily="49" charset="0"/>
+              </a:rPr>
+              <a:t>long</a:t>
+            </a:r>
+            <a:r>
+              <a:rPr lang="en-US" b="1" dirty="0">
+                <a:solidFill>
+                  <a:schemeClr val="tx1"/>
+                </a:solidFill>
+                <a:latin typeface="Courier New" pitchFamily="49" charset="0"/>
+                <a:cs typeface="Courier New" pitchFamily="49" charset="0"/>
+              </a:rPr>
+              <a:t> </a:t>
+            </a:r>
+            <a:r>
+              <a:rPr lang="en-US" b="1" dirty="0" err="1">
+                <a:solidFill>
+                  <a:schemeClr val="tx1"/>
+                </a:solidFill>
+                <a:latin typeface="Courier New" pitchFamily="49" charset="0"/>
+                <a:cs typeface="Courier New" pitchFamily="49" charset="0"/>
+              </a:rPr>
+              <a:t>num_of_cols</a:t>
+            </a:r>
+            <a:r>
+              <a:rPr lang="en-US" b="1" dirty="0">
+                <a:solidFill>
+                  <a:schemeClr val="tx1"/>
+                </a:solidFill>
+                <a:latin typeface="Courier New" pitchFamily="49" charset="0"/>
+                <a:cs typeface="Courier New" pitchFamily="49" charset="0"/>
+              </a:rPr>
+              <a:t>, </a:t>
+            </a:r>
+            <a:br>
+              <a:rPr lang="en-US" b="1" dirty="0">
+                <a:solidFill>
+                  <a:schemeClr val="tx1"/>
+                </a:solidFill>
+                <a:latin typeface="Courier New" pitchFamily="49" charset="0"/>
+                <a:cs typeface="Courier New" pitchFamily="49" charset="0"/>
+              </a:rPr>
+            </a:br>
+            <a:r>
+              <a:rPr lang="en-US" b="1" dirty="0">
+                <a:solidFill>
+                  <a:schemeClr val="tx1"/>
+                </a:solidFill>
+                <a:latin typeface="Courier New" pitchFamily="49" charset="0"/>
+                <a:cs typeface="Courier New" pitchFamily="49" charset="0"/>
+              </a:rPr>
+              <a:t>         </a:t>
+            </a:r>
+            <a:r>
+              <a:rPr lang="en-US" b="1" dirty="0">
+                <a:solidFill>
+                  <a:srgbClr val="0000FF"/>
+                </a:solidFill>
+                <a:latin typeface="Courier New" pitchFamily="49" charset="0"/>
+                <a:cs typeface="Courier New" pitchFamily="49" charset="0"/>
+              </a:rPr>
+              <a:t>long</a:t>
+            </a:r>
+            <a:r>
+              <a:rPr lang="en-US" b="1" dirty="0">
+                <a:solidFill>
+                  <a:schemeClr val="tx1"/>
+                </a:solidFill>
+                <a:latin typeface="Courier New" pitchFamily="49" charset="0"/>
+                <a:cs typeface="Courier New" pitchFamily="49" charset="0"/>
+              </a:rPr>
+              <a:t> *matrix[]) { .. }</a:t>
             </a:r>
           </a:p>
           <a:p>
@@ -16236,47 +16342,7 @@
                 <a:latin typeface="Courier New" pitchFamily="49" charset="0"/>
                 <a:cs typeface="Courier New" pitchFamily="49" charset="0"/>
               </a:rPr>
-              <a:t> </a:t>
-            </a:r>
-            <a:r>
-              <a:rPr lang="en-US" b="1" dirty="0" err="1">
-                <a:solidFill>
-                  <a:schemeClr val="tx1"/>
-                </a:solidFill>
-                <a:latin typeface="Courier New" pitchFamily="49" charset="0"/>
-                <a:cs typeface="Courier New" pitchFamily="49" charset="0"/>
-              </a:rPr>
-              <a:t>matrix_row</a:t>
-            </a:r>
-            <a:r>
-              <a:rPr lang="en-US" b="1" dirty="0">
-                <a:solidFill>
-                  <a:schemeClr val="tx1"/>
-                </a:solidFill>
-                <a:latin typeface="Courier New" pitchFamily="49" charset="0"/>
-                <a:cs typeface="Courier New" pitchFamily="49" charset="0"/>
-              </a:rPr>
-              <a:t>[][</a:t>
-            </a:r>
-            <a:r>
-              <a:rPr lang="en-US" b="1" dirty="0">
-                <a:solidFill>
-                  <a:srgbClr val="C00000"/>
-                </a:solidFill>
-                <a:latin typeface="Courier New" pitchFamily="49" charset="0"/>
-                <a:cs typeface="Courier New" pitchFamily="49" charset="0"/>
-              </a:rPr>
-              <a:t>20</a:t>
-            </a:r>
-            <a:r>
-              <a:rPr lang="en-US" b="1" dirty="0">
-                <a:solidFill>
-                  <a:schemeClr val="tx1"/>
-                </a:solidFill>
-                <a:latin typeface="Courier New" pitchFamily="49" charset="0"/>
-                <a:cs typeface="Courier New" pitchFamily="49" charset="0"/>
-              </a:rPr>
-              <a:t>]) { .. }</a:t>
+              <a:t> **matrix) { .. }</a:t>
             </a:r>
           </a:p>
         </p:txBody>
@@ -16295,7 +16361,7 @@
         </p:nvSpPr>
         <p:spPr>
           <a:xfrm>
-            <a:off x="994932" y="3911885"/>
+            <a:off x="994932" y="4775441"/>
             <a:ext cx="3155828" cy="369332"/>
           </a:xfrm>
           <a:prstGeom prst="rect">
@@ -16402,8 +16468,8 @@
         </p:nvSpPr>
         <p:spPr>
           <a:xfrm>
-            <a:off x="5539433" y="3315925"/>
-            <a:ext cx="3017192" cy="923330"/>
+            <a:off x="6696058" y="2164637"/>
+            <a:ext cx="2184174" cy="369332"/>
           </a:xfrm>
           <a:prstGeom prst="rect">
             <a:avLst/>
@@ -16435,7 +16501,7 @@
           <a:p>
             <a:r>
               <a:rPr lang="en-US" dirty="0"/>
-              <a:t>Cannot be omitted. The computer will not know where the next row starts.</a:t>
+              <a:t>Cannot be omitted. </a:t>
             </a:r>
           </a:p>
         </p:txBody>
@@ -16451,13 +16517,14 @@
           </p:cNvPr>
           <p:cNvCxnSpPr>
             <a:cxnSpLocks/>
+            <a:stCxn id="9" idx="1"/>
           </p:cNvCxnSpPr>
           <p:nvPr/>
         </p:nvCxnSpPr>
         <p:spPr>
           <a:xfrm flipH="1" flipV="1">
-            <a:off x="4921322" y="3020603"/>
-            <a:ext cx="582942" cy="682897"/>
+            <a:off x="4572000" y="2164637"/>
+            <a:ext cx="2124058" cy="184666"/>
           </a:xfrm>
           <a:prstGeom prst="straightConnector1">
             <a:avLst/>

</xml_diff>